<commit_message>
[master] updated the guide for setting up the rooms
</commit_message>
<xml_diff>
--- a/guides/setup_dual_mode_lessons.pptx
+++ b/guides/setup_dual_mode_lessons.pptx
@@ -5,15 +5,17 @@
     <p:sldMasterId id="2147483648" r:id="rId1"/>
   </p:sldMasterIdLst>
   <p:notesMasterIdLst>
-    <p:notesMasterId r:id="rId8"/>
+    <p:notesMasterId r:id="rId10"/>
   </p:notesMasterIdLst>
   <p:sldIdLst>
     <p:sldId id="259" r:id="rId2"/>
     <p:sldId id="320" r:id="rId3"/>
-    <p:sldId id="323" r:id="rId4"/>
-    <p:sldId id="325" r:id="rId5"/>
-    <p:sldId id="326" r:id="rId6"/>
-    <p:sldId id="327" r:id="rId7"/>
+    <p:sldId id="329" r:id="rId4"/>
+    <p:sldId id="323" r:id="rId5"/>
+    <p:sldId id="328" r:id="rId6"/>
+    <p:sldId id="325" r:id="rId7"/>
+    <p:sldId id="326" r:id="rId8"/>
+    <p:sldId id="327" r:id="rId9"/>
   </p:sldIdLst>
   <p:sldSz cx="12192000" cy="6858000"/>
   <p:notesSz cx="6858000" cy="9144000"/>
@@ -2733,7 +2735,7 @@
           <a:p>
             <a:r>
               <a:rPr lang="en-IT" dirty="0"/>
-              <a:t>Room Be</a:t>
+              <a:t>Common to all rooms: Check Green Pass</a:t>
             </a:r>
           </a:p>
         </p:txBody>
@@ -2762,7 +2764,7 @@
         </p:spPr>
         <p:txBody>
           <a:bodyPr>
-            <a:normAutofit fontScale="92500" lnSpcReduction="20000"/>
+            <a:normAutofit/>
           </a:bodyPr>
           <a:lstStyle/>
           <a:p>
@@ -2770,158 +2772,23 @@
               <a:rPr lang="en-US" dirty="0">
                 <a:ea typeface="Palatino" pitchFamily="2" charset="77"/>
               </a:rPr>
-              <a:t>Step 1: turn on the projector and </a:t>
-            </a:r>
-            <a:r>
-              <a:rPr lang="en-US" dirty="0" err="1">
-                <a:ea typeface="Palatino" pitchFamily="2" charset="77"/>
-              </a:rPr>
-              <a:t>TesiraForte</a:t>
-            </a:r>
+              <a:t>Green pass should be checked upon student entrance</a:t>
+            </a:r>
+          </a:p>
+          <a:p>
             <a:endParaRPr lang="en-US" dirty="0">
               <a:ea typeface="Palatino" pitchFamily="2" charset="77"/>
             </a:endParaRPr>
           </a:p>
           <a:p>
-            <a:pPr lvl="1"/>
-            <a:r>
-              <a:rPr lang="en-US" dirty="0">
-                <a:ea typeface="Palatino" pitchFamily="2" charset="77"/>
-              </a:rPr>
-              <a:t>The projector remote is near the black board</a:t>
-            </a:r>
-          </a:p>
-          <a:p>
-            <a:pPr lvl="1"/>
-            <a:r>
-              <a:rPr lang="en-US" dirty="0" err="1">
-                <a:ea typeface="Palatino" pitchFamily="2" charset="77"/>
-              </a:rPr>
-              <a:t>TesiraForte</a:t>
-            </a:r>
-            <a:r>
-              <a:rPr lang="en-US" dirty="0">
-                <a:ea typeface="Palatino" pitchFamily="2" charset="77"/>
-              </a:rPr>
-              <a:t> should be turned on and working</a:t>
-            </a:r>
-          </a:p>
-          <a:p>
-            <a:r>
-              <a:rPr lang="en-US" dirty="0">
-                <a:ea typeface="Palatino" pitchFamily="2" charset="77"/>
-              </a:rPr>
-              <a:t>Step 2: connect the computer</a:t>
-            </a:r>
-          </a:p>
-          <a:p>
-            <a:pPr lvl="1"/>
-            <a:r>
-              <a:rPr lang="en-US" dirty="0">
-                <a:ea typeface="Palatino" pitchFamily="2" charset="77"/>
-              </a:rPr>
-              <a:t>Connect the HDMI cable coming from the “white tower” (projector) to the computer </a:t>
-            </a:r>
-          </a:p>
-          <a:p>
-            <a:pPr lvl="1"/>
-            <a:r>
-              <a:rPr lang="en-US" dirty="0">
-                <a:ea typeface="Palatino" pitchFamily="2" charset="77"/>
-              </a:rPr>
-              <a:t>Connect the USB cable coming from the “black box” (</a:t>
-            </a:r>
-            <a:r>
-              <a:rPr lang="en-US" dirty="0" err="1">
-                <a:ea typeface="Palatino" pitchFamily="2" charset="77"/>
-              </a:rPr>
-              <a:t>TesiraForte</a:t>
-            </a:r>
-            <a:r>
-              <a:rPr lang="en-US" dirty="0">
-                <a:ea typeface="Palatino" pitchFamily="2" charset="77"/>
-              </a:rPr>
-              <a:t>) to the computer</a:t>
-            </a:r>
-          </a:p>
-          <a:p>
-            <a:r>
-              <a:rPr lang="en-US" dirty="0">
-                <a:ea typeface="Palatino" pitchFamily="2" charset="77"/>
-              </a:rPr>
-              <a:t>Step 3: turn on the webcam (optional for us)</a:t>
-            </a:r>
-          </a:p>
-          <a:p>
-            <a:pPr lvl="1"/>
-            <a:r>
-              <a:rPr lang="en-US" dirty="0">
-                <a:ea typeface="Palatino" pitchFamily="2" charset="77"/>
-              </a:rPr>
-              <a:t>If you want to use the EPSON webcam instead of the integrated webcam, turn on the EPSON cam and position it</a:t>
-            </a:r>
-          </a:p>
-          <a:p>
-            <a:r>
-              <a:rPr lang="en-US" dirty="0">
-                <a:ea typeface="Palatino" pitchFamily="2" charset="77"/>
-              </a:rPr>
-              <a:t>Step 4: setup Zoom</a:t>
-            </a:r>
-          </a:p>
-          <a:p>
-            <a:pPr lvl="1"/>
-            <a:r>
-              <a:rPr lang="en-US" dirty="0">
-                <a:ea typeface="Palatino" pitchFamily="2" charset="77"/>
-              </a:rPr>
-              <a:t>Turn on Zoom</a:t>
-            </a:r>
-          </a:p>
-          <a:p>
-            <a:pPr lvl="1"/>
-            <a:r>
-              <a:rPr lang="en-US" dirty="0">
-                <a:ea typeface="Palatino" pitchFamily="2" charset="77"/>
-              </a:rPr>
-              <a:t>If you did Step 3, select EPSON as Video Source and check that the cam rotation is ok, otherwise rotate it by 180 degrees (Go To &gt; Video Settings &gt; Tap the white button in the right corner of the webcam preview)</a:t>
-            </a:r>
-          </a:p>
-          <a:p>
-            <a:pPr lvl="1"/>
-            <a:r>
-              <a:rPr lang="en-US" dirty="0">
-                <a:ea typeface="Palatino" pitchFamily="2" charset="77"/>
-              </a:rPr>
-              <a:t>Under Audio settings, select </a:t>
-            </a:r>
-            <a:r>
-              <a:rPr lang="en-US" dirty="0" err="1">
-                <a:ea typeface="Palatino" pitchFamily="2" charset="77"/>
-              </a:rPr>
-              <a:t>TesiraForte</a:t>
-            </a:r>
-            <a:r>
-              <a:rPr lang="en-US" dirty="0">
-                <a:ea typeface="Palatino" pitchFamily="2" charset="77"/>
-              </a:rPr>
-              <a:t> as Microphone source (remember that the microphone on the desk must be unmuted to work. Tap it to unmute it: ring will turn green).</a:t>
-            </a:r>
-          </a:p>
-          <a:p>
-            <a:pPr lvl="1"/>
-            <a:r>
-              <a:rPr lang="en-US" dirty="0">
-                <a:ea typeface="Palatino" pitchFamily="2" charset="77"/>
-              </a:rPr>
-              <a:t>Under Audio settings, select HDMI NP-P525UL as Speaker output (this is the projector that will also act as speaker for students that asks questions from home). Alternatively, select </a:t>
-            </a:r>
-            <a:r>
-              <a:rPr lang="en-US" dirty="0" err="1">
-                <a:ea typeface="Palatino" pitchFamily="2" charset="77"/>
-              </a:rPr>
-              <a:t>TesiraForte</a:t>
-            </a:r>
+            <a:r>
+              <a:rPr lang="en-US" dirty="0">
+                <a:ea typeface="Palatino" pitchFamily="2" charset="77"/>
+              </a:rPr>
+              <a:t>Green pass should be valid (“Green pass base”)</a:t>
+            </a:r>
+          </a:p>
+          <a:p>
             <a:endParaRPr lang="en-US" dirty="0">
               <a:ea typeface="Palatino" pitchFamily="2" charset="77"/>
             </a:endParaRPr>
@@ -2937,7 +2804,7 @@
     </p:spTree>
     <p:extLst>
       <p:ext uri="{BB962C8B-B14F-4D97-AF65-F5344CB8AC3E}">
-        <p14:creationId xmlns:p14="http://schemas.microsoft.com/office/powerpoint/2010/main" val="3639342300"/>
+        <p14:creationId xmlns:p14="http://schemas.microsoft.com/office/powerpoint/2010/main" val="1023936382"/>
       </p:ext>
     </p:extLst>
   </p:cSld>
@@ -2987,7 +2854,7 @@
           <a:p>
             <a:r>
               <a:rPr lang="en-IT" dirty="0"/>
-              <a:t>Room Be</a:t>
+              <a:t>Common to all rooms: EasyBadge</a:t>
             </a:r>
           </a:p>
         </p:txBody>
@@ -3024,20 +2891,226 @@
               <a:rPr lang="en-US" dirty="0">
                 <a:ea typeface="Palatino" pitchFamily="2" charset="77"/>
               </a:rPr>
-              <a:t>To be tested (Step 4): in alternative to selecting HDMI NP-P525UL as Speaker output, turn on the speaker system of the room (should be already turned on) and select </a:t>
+              <a:t>Step 1:  Go to &gt; </a:t>
+            </a:r>
+            <a:r>
+              <a:rPr lang="en-US" dirty="0">
+                <a:ea typeface="Palatino" pitchFamily="2" charset="77"/>
+                <a:hlinkClick r:id="rId2"/>
+              </a:rPr>
+              <a:t>https://gestionedidattica.unipd.it</a:t>
+            </a:r>
+            <a:r>
+              <a:rPr lang="en-US" dirty="0">
+                <a:ea typeface="Palatino" pitchFamily="2" charset="77"/>
+              </a:rPr>
+              <a:t> </a:t>
+            </a:r>
+          </a:p>
+          <a:p>
+            <a:r>
+              <a:rPr lang="en-US" dirty="0">
+                <a:ea typeface="Palatino" pitchFamily="2" charset="77"/>
+              </a:rPr>
+              <a:t>Step 2: Log in with the University credentials</a:t>
+            </a:r>
+          </a:p>
+          <a:p>
+            <a:r>
+              <a:rPr lang="en-US" dirty="0">
+                <a:ea typeface="Palatino" pitchFamily="2" charset="77"/>
+              </a:rPr>
+              <a:t>Step 3: Select </a:t>
             </a:r>
             <a:r>
               <a:rPr lang="en-US" dirty="0" err="1">
                 <a:ea typeface="Palatino" pitchFamily="2" charset="77"/>
               </a:rPr>
-              <a:t>TesiraForte</a:t>
-            </a:r>
-            <a:r>
-              <a:rPr lang="en-US" dirty="0">
-                <a:ea typeface="Palatino" pitchFamily="2" charset="77"/>
-              </a:rPr>
-              <a:t>. This should allow to use the room sound system instead of the projector as speaker.</a:t>
-            </a:r>
+              <a:t>EasyBadge</a:t>
+            </a:r>
+            <a:endParaRPr lang="en-US" dirty="0">
+              <a:ea typeface="Palatino" pitchFamily="2" charset="77"/>
+            </a:endParaRPr>
+          </a:p>
+          <a:p>
+            <a:r>
+              <a:rPr lang="en-US" dirty="0">
+                <a:ea typeface="Palatino" pitchFamily="2" charset="77"/>
+              </a:rPr>
+              <a:t>Step 4: Select the lesson</a:t>
+            </a:r>
+          </a:p>
+          <a:p>
+            <a:r>
+              <a:rPr lang="en-US" dirty="0">
+                <a:ea typeface="Palatino" pitchFamily="2" charset="77"/>
+              </a:rPr>
+              <a:t>Step 5: Select “</a:t>
+            </a:r>
+            <a:r>
+              <a:rPr lang="en-US" dirty="0" err="1">
+                <a:ea typeface="Palatino" pitchFamily="2" charset="77"/>
+              </a:rPr>
+              <a:t>Crea</a:t>
+            </a:r>
+            <a:r>
+              <a:rPr lang="en-US" dirty="0">
+                <a:ea typeface="Palatino" pitchFamily="2" charset="77"/>
+              </a:rPr>
+              <a:t> </a:t>
+            </a:r>
+            <a:r>
+              <a:rPr lang="en-US" dirty="0" err="1">
+                <a:ea typeface="Palatino" pitchFamily="2" charset="77"/>
+              </a:rPr>
+              <a:t>codice</a:t>
+            </a:r>
+            <a:r>
+              <a:rPr lang="en-US" dirty="0">
+                <a:ea typeface="Palatino" pitchFamily="2" charset="77"/>
+              </a:rPr>
+              <a:t>”</a:t>
+            </a:r>
+          </a:p>
+          <a:p>
+            <a:r>
+              <a:rPr lang="en-US" dirty="0">
+                <a:ea typeface="Palatino" pitchFamily="2" charset="77"/>
+              </a:rPr>
+              <a:t>Step 6: Select “</a:t>
+            </a:r>
+            <a:r>
+              <a:rPr lang="en-US" dirty="0" err="1">
+                <a:ea typeface="Palatino" pitchFamily="2" charset="77"/>
+              </a:rPr>
+              <a:t>Proietta</a:t>
+            </a:r>
+            <a:r>
+              <a:rPr lang="en-US" dirty="0">
+                <a:ea typeface="Palatino" pitchFamily="2" charset="77"/>
+              </a:rPr>
+              <a:t> </a:t>
+            </a:r>
+            <a:r>
+              <a:rPr lang="en-US" dirty="0" err="1">
+                <a:ea typeface="Palatino" pitchFamily="2" charset="77"/>
+              </a:rPr>
+              <a:t>codice</a:t>
+            </a:r>
+            <a:r>
+              <a:rPr lang="en-US" dirty="0">
+                <a:ea typeface="Palatino" pitchFamily="2" charset="77"/>
+              </a:rPr>
+              <a:t> </a:t>
+            </a:r>
+            <a:r>
+              <a:rPr lang="en-US" dirty="0" err="1">
+                <a:ea typeface="Palatino" pitchFamily="2" charset="77"/>
+              </a:rPr>
+              <a:t>statico</a:t>
+            </a:r>
+            <a:r>
+              <a:rPr lang="en-US" dirty="0">
+                <a:ea typeface="Palatino" pitchFamily="2" charset="77"/>
+              </a:rPr>
+              <a:t>” to project the code for the students or write it on the black board (note that there is a different code for each room, so there are different code for room </a:t>
+            </a:r>
+            <a:r>
+              <a:rPr lang="en-US" dirty="0" err="1">
+                <a:ea typeface="Palatino" pitchFamily="2" charset="77"/>
+              </a:rPr>
+              <a:t>Te</a:t>
+            </a:r>
+            <a:r>
+              <a:rPr lang="en-US" dirty="0">
+                <a:ea typeface="Palatino" pitchFamily="2" charset="77"/>
+              </a:rPr>
+              <a:t> and </a:t>
+            </a:r>
+            <a:r>
+              <a:rPr lang="en-US" dirty="0" err="1">
+                <a:ea typeface="Palatino" pitchFamily="2" charset="77"/>
+              </a:rPr>
+              <a:t>Ue</a:t>
+            </a:r>
+            <a:r>
+              <a:rPr lang="en-US">
+                <a:ea typeface="Palatino" pitchFamily="2" charset="77"/>
+              </a:rPr>
+              <a:t>)</a:t>
+            </a:r>
+            <a:endParaRPr lang="en-US" dirty="0">
+              <a:ea typeface="Palatino" pitchFamily="2" charset="77"/>
+            </a:endParaRPr>
+          </a:p>
+          <a:p>
+            <a:r>
+              <a:rPr lang="en-US" dirty="0">
+                <a:ea typeface="Palatino" pitchFamily="2" charset="77"/>
+              </a:rPr>
+              <a:t>Step 7: at the end of the lesson, check that everybody checked in</a:t>
+            </a:r>
+          </a:p>
+          <a:p>
+            <a:r>
+              <a:rPr lang="en-US" dirty="0">
+                <a:ea typeface="Palatino" pitchFamily="2" charset="77"/>
+              </a:rPr>
+              <a:t>Step 8: check the activity as done (“</a:t>
+            </a:r>
+            <a:r>
+              <a:rPr lang="en-US" dirty="0" err="1">
+                <a:ea typeface="Palatino" pitchFamily="2" charset="77"/>
+              </a:rPr>
+              <a:t>Segna</a:t>
+            </a:r>
+            <a:r>
+              <a:rPr lang="en-US" dirty="0">
+                <a:ea typeface="Palatino" pitchFamily="2" charset="77"/>
+              </a:rPr>
+              <a:t> </a:t>
+            </a:r>
+            <a:r>
+              <a:rPr lang="en-US" dirty="0" err="1">
+                <a:ea typeface="Palatino" pitchFamily="2" charset="77"/>
+              </a:rPr>
+              <a:t>questa</a:t>
+            </a:r>
+            <a:r>
+              <a:rPr lang="en-US" dirty="0">
+                <a:ea typeface="Palatino" pitchFamily="2" charset="77"/>
+              </a:rPr>
+              <a:t> </a:t>
+            </a:r>
+            <a:r>
+              <a:rPr lang="en-US" dirty="0" err="1">
+                <a:ea typeface="Palatino" pitchFamily="2" charset="77"/>
+              </a:rPr>
+              <a:t>attività</a:t>
+            </a:r>
+            <a:r>
+              <a:rPr lang="en-US" dirty="0">
+                <a:ea typeface="Palatino" pitchFamily="2" charset="77"/>
+              </a:rPr>
+              <a:t> come </a:t>
+            </a:r>
+            <a:r>
+              <a:rPr lang="en-US" dirty="0" err="1">
+                <a:ea typeface="Palatino" pitchFamily="2" charset="77"/>
+              </a:rPr>
+              <a:t>svolta</a:t>
+            </a:r>
+            <a:r>
+              <a:rPr lang="en-US" dirty="0">
+                <a:ea typeface="Palatino" pitchFamily="2" charset="77"/>
+              </a:rPr>
+              <a:t>”)</a:t>
+            </a:r>
+          </a:p>
+          <a:p>
+            <a:endParaRPr lang="en-US" dirty="0">
+              <a:ea typeface="Palatino" pitchFamily="2" charset="77"/>
+            </a:endParaRPr>
           </a:p>
           <a:p>
             <a:pPr lvl="1"/>
@@ -3050,7 +3123,7 @@
     </p:spTree>
     <p:extLst>
       <p:ext uri="{BB962C8B-B14F-4D97-AF65-F5344CB8AC3E}">
-        <p14:creationId xmlns:p14="http://schemas.microsoft.com/office/powerpoint/2010/main" val="412938232"/>
+        <p14:creationId xmlns:p14="http://schemas.microsoft.com/office/powerpoint/2010/main" val="3639342300"/>
       </p:ext>
     </p:extLst>
   </p:cSld>
@@ -3100,7 +3173,7 @@
           <a:p>
             <a:r>
               <a:rPr lang="en-IT" dirty="0"/>
-              <a:t>Room Te and Ue</a:t>
+              <a:t>Room Be</a:t>
             </a:r>
           </a:p>
         </p:txBody>
@@ -3123,6 +3196,373 @@
         </p:nvSpPr>
         <p:spPr>
           <a:xfrm>
+            <a:off x="447782" y="1364343"/>
+            <a:ext cx="10445774" cy="5331731"/>
+          </a:xfrm>
+        </p:spPr>
+        <p:txBody>
+          <a:bodyPr>
+            <a:normAutofit fontScale="92500" lnSpcReduction="20000"/>
+          </a:bodyPr>
+          <a:lstStyle/>
+          <a:p>
+            <a:r>
+              <a:rPr lang="en-US" dirty="0">
+                <a:ea typeface="Palatino" pitchFamily="2" charset="77"/>
+              </a:rPr>
+              <a:t>Step 1: turn on the projector and </a:t>
+            </a:r>
+            <a:r>
+              <a:rPr lang="en-US" dirty="0" err="1">
+                <a:ea typeface="Palatino" pitchFamily="2" charset="77"/>
+              </a:rPr>
+              <a:t>TesiraForte</a:t>
+            </a:r>
+            <a:endParaRPr lang="en-US" dirty="0">
+              <a:ea typeface="Palatino" pitchFamily="2" charset="77"/>
+            </a:endParaRPr>
+          </a:p>
+          <a:p>
+            <a:pPr lvl="1"/>
+            <a:r>
+              <a:rPr lang="en-US" dirty="0">
+                <a:ea typeface="Palatino" pitchFamily="2" charset="77"/>
+              </a:rPr>
+              <a:t>The projector remote is near the black board</a:t>
+            </a:r>
+          </a:p>
+          <a:p>
+            <a:pPr lvl="1"/>
+            <a:r>
+              <a:rPr lang="en-US" dirty="0" err="1">
+                <a:ea typeface="Palatino" pitchFamily="2" charset="77"/>
+              </a:rPr>
+              <a:t>TesiraForte</a:t>
+            </a:r>
+            <a:r>
+              <a:rPr lang="en-US" dirty="0">
+                <a:ea typeface="Palatino" pitchFamily="2" charset="77"/>
+              </a:rPr>
+              <a:t> should be turned on and working</a:t>
+            </a:r>
+          </a:p>
+          <a:p>
+            <a:r>
+              <a:rPr lang="en-US" dirty="0">
+                <a:ea typeface="Palatino" pitchFamily="2" charset="77"/>
+              </a:rPr>
+              <a:t>Step 2: connect the computer</a:t>
+            </a:r>
+          </a:p>
+          <a:p>
+            <a:pPr lvl="1"/>
+            <a:r>
+              <a:rPr lang="en-US" dirty="0">
+                <a:ea typeface="Palatino" pitchFamily="2" charset="77"/>
+              </a:rPr>
+              <a:t>Connect the HDMI cable coming from the “white tower” (projector) to the computer </a:t>
+            </a:r>
+          </a:p>
+          <a:p>
+            <a:pPr lvl="1"/>
+            <a:r>
+              <a:rPr lang="en-US" dirty="0">
+                <a:ea typeface="Palatino" pitchFamily="2" charset="77"/>
+              </a:rPr>
+              <a:t>Connect the USB cable coming from the “black box” (</a:t>
+            </a:r>
+            <a:r>
+              <a:rPr lang="en-US" dirty="0" err="1">
+                <a:ea typeface="Palatino" pitchFamily="2" charset="77"/>
+              </a:rPr>
+              <a:t>TesiraForte</a:t>
+            </a:r>
+            <a:r>
+              <a:rPr lang="en-US" dirty="0">
+                <a:ea typeface="Palatino" pitchFamily="2" charset="77"/>
+              </a:rPr>
+              <a:t>) to the computer</a:t>
+            </a:r>
+          </a:p>
+          <a:p>
+            <a:r>
+              <a:rPr lang="en-US" dirty="0">
+                <a:ea typeface="Palatino" pitchFamily="2" charset="77"/>
+              </a:rPr>
+              <a:t>Step 3: turn on the webcam (optional for us)</a:t>
+            </a:r>
+          </a:p>
+          <a:p>
+            <a:pPr lvl="1"/>
+            <a:r>
+              <a:rPr lang="en-US" dirty="0">
+                <a:ea typeface="Palatino" pitchFamily="2" charset="77"/>
+              </a:rPr>
+              <a:t>If you want to use the EPSON webcam instead of the integrated webcam, turn on the EPSON cam and position it</a:t>
+            </a:r>
+          </a:p>
+          <a:p>
+            <a:r>
+              <a:rPr lang="en-US" dirty="0">
+                <a:ea typeface="Palatino" pitchFamily="2" charset="77"/>
+              </a:rPr>
+              <a:t>Step 4: setup Zoom</a:t>
+            </a:r>
+          </a:p>
+          <a:p>
+            <a:pPr lvl="1"/>
+            <a:r>
+              <a:rPr lang="en-US" dirty="0">
+                <a:ea typeface="Palatino" pitchFamily="2" charset="77"/>
+              </a:rPr>
+              <a:t>Turn on Zoom</a:t>
+            </a:r>
+          </a:p>
+          <a:p>
+            <a:pPr lvl="1"/>
+            <a:r>
+              <a:rPr lang="en-US" dirty="0">
+                <a:ea typeface="Palatino" pitchFamily="2" charset="77"/>
+              </a:rPr>
+              <a:t>If you did Step 3, select EPSON as Video Source and check that the cam rotation is ok, otherwise rotate it by 180 degrees (Go To &gt; Video Settings &gt; Tap the white button in the right corner of the webcam preview)</a:t>
+            </a:r>
+          </a:p>
+          <a:p>
+            <a:pPr lvl="1"/>
+            <a:r>
+              <a:rPr lang="en-US" dirty="0">
+                <a:ea typeface="Palatino" pitchFamily="2" charset="77"/>
+              </a:rPr>
+              <a:t>Under Audio settings, select </a:t>
+            </a:r>
+            <a:r>
+              <a:rPr lang="en-US" dirty="0" err="1">
+                <a:ea typeface="Palatino" pitchFamily="2" charset="77"/>
+              </a:rPr>
+              <a:t>TesiraForte</a:t>
+            </a:r>
+            <a:r>
+              <a:rPr lang="en-US" dirty="0">
+                <a:ea typeface="Palatino" pitchFamily="2" charset="77"/>
+              </a:rPr>
+              <a:t> as Microphone source (remember that the microphone on the desk must be unmuted to work. Tap it to unmute it: ring will turn green).</a:t>
+            </a:r>
+          </a:p>
+          <a:p>
+            <a:pPr lvl="1"/>
+            <a:r>
+              <a:rPr lang="en-US" dirty="0">
+                <a:ea typeface="Palatino" pitchFamily="2" charset="77"/>
+              </a:rPr>
+              <a:t>Under Audio settings, select HDMI NP-P525UL as Speaker output (this is the projector that will also act as speaker for students that asks questions from home). Alternatively, select </a:t>
+            </a:r>
+            <a:r>
+              <a:rPr lang="en-US" dirty="0" err="1">
+                <a:ea typeface="Palatino" pitchFamily="2" charset="77"/>
+              </a:rPr>
+              <a:t>TesiraForte</a:t>
+            </a:r>
+            <a:endParaRPr lang="en-US" dirty="0">
+              <a:ea typeface="Palatino" pitchFamily="2" charset="77"/>
+            </a:endParaRPr>
+          </a:p>
+          <a:p>
+            <a:pPr lvl="1"/>
+            <a:endParaRPr lang="en-US" dirty="0">
+              <a:ea typeface="Palatino" pitchFamily="2" charset="77"/>
+            </a:endParaRPr>
+          </a:p>
+        </p:txBody>
+      </p:sp>
+    </p:spTree>
+    <p:extLst>
+      <p:ext uri="{BB962C8B-B14F-4D97-AF65-F5344CB8AC3E}">
+        <p14:creationId xmlns:p14="http://schemas.microsoft.com/office/powerpoint/2010/main" val="2551430365"/>
+      </p:ext>
+    </p:extLst>
+  </p:cSld>
+  <p:clrMapOvr>
+    <a:masterClrMapping/>
+  </p:clrMapOvr>
+</p:sld>
+</file>
+
+<file path=ppt/slides/slide6.xml><?xml version="1.0" encoding="utf-8"?>
+<p:sld xmlns:a="http://schemas.openxmlformats.org/drawingml/2006/main" xmlns:r="http://schemas.openxmlformats.org/officeDocument/2006/relationships" xmlns:p="http://schemas.openxmlformats.org/presentationml/2006/main">
+  <p:cSld>
+    <p:spTree>
+      <p:nvGrpSpPr>
+        <p:cNvPr id="1" name=""/>
+        <p:cNvGrpSpPr/>
+        <p:nvPr/>
+      </p:nvGrpSpPr>
+      <p:grpSpPr>
+        <a:xfrm>
+          <a:off x="0" y="0"/>
+          <a:ext cx="0" cy="0"/>
+          <a:chOff x="0" y="0"/>
+          <a:chExt cx="0" cy="0"/>
+        </a:xfrm>
+      </p:grpSpPr>
+      <p:sp>
+        <p:nvSpPr>
+          <p:cNvPr id="2" name="Title 1">
+            <a:extLst>
+              <a:ext uri="{FF2B5EF4-FFF2-40B4-BE49-F238E27FC236}">
+                <a16:creationId xmlns:a16="http://schemas.microsoft.com/office/drawing/2014/main" id="{DCEB9E4F-F82C-A64F-809D-B943BB0A7B79}"/>
+              </a:ext>
+            </a:extLst>
+          </p:cNvPr>
+          <p:cNvSpPr>
+            <a:spLocks noGrp="1"/>
+          </p:cNvSpPr>
+          <p:nvPr>
+            <p:ph type="title"/>
+          </p:nvPr>
+        </p:nvSpPr>
+        <p:spPr/>
+        <p:txBody>
+          <a:bodyPr/>
+          <a:lstStyle/>
+          <a:p>
+            <a:r>
+              <a:rPr lang="en-IT" dirty="0"/>
+              <a:t>Room Be</a:t>
+            </a:r>
+          </a:p>
+        </p:txBody>
+      </p:sp>
+      <p:sp>
+        <p:nvSpPr>
+          <p:cNvPr id="3" name="Content Placeholder 2">
+            <a:extLst>
+              <a:ext uri="{FF2B5EF4-FFF2-40B4-BE49-F238E27FC236}">
+                <a16:creationId xmlns:a16="http://schemas.microsoft.com/office/drawing/2014/main" id="{07EEA99A-73A7-F949-9D8F-EEED9045B6FA}"/>
+              </a:ext>
+            </a:extLst>
+          </p:cNvPr>
+          <p:cNvSpPr>
+            <a:spLocks noGrp="1"/>
+          </p:cNvSpPr>
+          <p:nvPr>
+            <p:ph sz="half" idx="1"/>
+          </p:nvPr>
+        </p:nvSpPr>
+        <p:spPr>
+          <a:xfrm>
+            <a:off x="447782" y="1364343"/>
+            <a:ext cx="10445774" cy="5331731"/>
+          </a:xfrm>
+        </p:spPr>
+        <p:txBody>
+          <a:bodyPr>
+            <a:normAutofit/>
+          </a:bodyPr>
+          <a:lstStyle/>
+          <a:p>
+            <a:r>
+              <a:rPr lang="en-US" dirty="0">
+                <a:ea typeface="Palatino" pitchFamily="2" charset="77"/>
+              </a:rPr>
+              <a:t>To be tested (Step 4): in alternative to selecting HDMI NP-P525UL as Speaker output, turn on the speaker system of the room (should be already turned on) and select </a:t>
+            </a:r>
+            <a:r>
+              <a:rPr lang="en-US" dirty="0" err="1">
+                <a:ea typeface="Palatino" pitchFamily="2" charset="77"/>
+              </a:rPr>
+              <a:t>TesiraForte</a:t>
+            </a:r>
+            <a:r>
+              <a:rPr lang="en-US" dirty="0">
+                <a:ea typeface="Palatino" pitchFamily="2" charset="77"/>
+              </a:rPr>
+              <a:t>. This should allow to use the room sound system instead of the projector as speaker.</a:t>
+            </a:r>
+          </a:p>
+          <a:p>
+            <a:pPr lvl="1"/>
+            <a:endParaRPr lang="en-US" dirty="0">
+              <a:ea typeface="Palatino" pitchFamily="2" charset="77"/>
+            </a:endParaRPr>
+          </a:p>
+        </p:txBody>
+      </p:sp>
+    </p:spTree>
+    <p:extLst>
+      <p:ext uri="{BB962C8B-B14F-4D97-AF65-F5344CB8AC3E}">
+        <p14:creationId xmlns:p14="http://schemas.microsoft.com/office/powerpoint/2010/main" val="412938232"/>
+      </p:ext>
+    </p:extLst>
+  </p:cSld>
+  <p:clrMapOvr>
+    <a:masterClrMapping/>
+  </p:clrMapOvr>
+</p:sld>
+</file>
+
+<file path=ppt/slides/slide7.xml><?xml version="1.0" encoding="utf-8"?>
+<p:sld xmlns:a="http://schemas.openxmlformats.org/drawingml/2006/main" xmlns:r="http://schemas.openxmlformats.org/officeDocument/2006/relationships" xmlns:p="http://schemas.openxmlformats.org/presentationml/2006/main">
+  <p:cSld>
+    <p:spTree>
+      <p:nvGrpSpPr>
+        <p:cNvPr id="1" name=""/>
+        <p:cNvGrpSpPr/>
+        <p:nvPr/>
+      </p:nvGrpSpPr>
+      <p:grpSpPr>
+        <a:xfrm>
+          <a:off x="0" y="0"/>
+          <a:ext cx="0" cy="0"/>
+          <a:chOff x="0" y="0"/>
+          <a:chExt cx="0" cy="0"/>
+        </a:xfrm>
+      </p:grpSpPr>
+      <p:sp>
+        <p:nvSpPr>
+          <p:cNvPr id="2" name="Title 1">
+            <a:extLst>
+              <a:ext uri="{FF2B5EF4-FFF2-40B4-BE49-F238E27FC236}">
+                <a16:creationId xmlns:a16="http://schemas.microsoft.com/office/drawing/2014/main" id="{DCEB9E4F-F82C-A64F-809D-B943BB0A7B79}"/>
+              </a:ext>
+            </a:extLst>
+          </p:cNvPr>
+          <p:cNvSpPr>
+            <a:spLocks noGrp="1"/>
+          </p:cNvSpPr>
+          <p:nvPr>
+            <p:ph type="title"/>
+          </p:nvPr>
+        </p:nvSpPr>
+        <p:spPr/>
+        <p:txBody>
+          <a:bodyPr/>
+          <a:lstStyle/>
+          <a:p>
+            <a:r>
+              <a:rPr lang="en-IT" dirty="0"/>
+              <a:t>Room Te and Ue</a:t>
+            </a:r>
+          </a:p>
+        </p:txBody>
+      </p:sp>
+      <p:sp>
+        <p:nvSpPr>
+          <p:cNvPr id="3" name="Content Placeholder 2">
+            <a:extLst>
+              <a:ext uri="{FF2B5EF4-FFF2-40B4-BE49-F238E27FC236}">
+                <a16:creationId xmlns:a16="http://schemas.microsoft.com/office/drawing/2014/main" id="{07EEA99A-73A7-F949-9D8F-EEED9045B6FA}"/>
+              </a:ext>
+            </a:extLst>
+          </p:cNvPr>
+          <p:cNvSpPr>
+            <a:spLocks noGrp="1"/>
+          </p:cNvSpPr>
+          <p:nvPr>
+            <p:ph sz="half" idx="1"/>
+          </p:nvPr>
+        </p:nvSpPr>
+        <p:spPr>
+          <a:xfrm>
             <a:off x="447781" y="1364343"/>
             <a:ext cx="10976431" cy="5493657"/>
           </a:xfrm>
@@ -3376,7 +3816,7 @@
 </p:sld>
 </file>
 
-<file path=ppt/slides/slide6.xml><?xml version="1.0" encoding="utf-8"?>
+<file path=ppt/slides/slide8.xml><?xml version="1.0" encoding="utf-8"?>
 <p:sld xmlns:a="http://schemas.openxmlformats.org/drawingml/2006/main" xmlns:r="http://schemas.openxmlformats.org/officeDocument/2006/relationships" xmlns:p="http://schemas.openxmlformats.org/presentationml/2006/main">
   <p:cSld>
     <p:spTree>

</xml_diff>